<commit_message>
Update HTML book link
</commit_message>
<xml_diff>
--- a/lesson01.pptx
+++ b/lesson01.pptx
@@ -214,72 +214,27 @@
 <file path=ppt/changesInfos/changesInfo1.xml><?xml version="1.0" encoding="utf-8"?>
 <pc:chgInfo xmlns:a="http://schemas.openxmlformats.org/drawingml/2006/main" xmlns:r="http://schemas.openxmlformats.org/officeDocument/2006/relationships" xmlns:ac="http://schemas.microsoft.com/office/drawing/2013/main/command" xmlns:pc="http://schemas.microsoft.com/office/powerpoint/2013/main/command">
   <pc:docChgLst>
-    <pc:chgData name="Anatoliy Kigel" userId="7432c6c4687b0a9c" providerId="LiveId" clId="{2DBBE828-6D70-4F0D-9DD0-E666E70807B9}"/>
-    <pc:docChg chg="addSld delSld modSld modSection">
-      <pc:chgData name="Anatoliy Kigel" userId="7432c6c4687b0a9c" providerId="LiveId" clId="{2DBBE828-6D70-4F0D-9DD0-E666E70807B9}" dt="2021-02-02T21:44:42.244" v="2" actId="20577"/>
+    <pc:chgData name="Anatoliy Kigel" userId="7432c6c4687b0a9c" providerId="LiveId" clId="{9F95820F-F509-418B-82B8-792B22D34A7F}"/>
+    <pc:docChg chg="custSel delSld modSld modSection">
+      <pc:chgData name="Anatoliy Kigel" userId="7432c6c4687b0a9c" providerId="LiveId" clId="{9F95820F-F509-418B-82B8-792B22D34A7F}" dt="2022-06-01T06:46:33.404" v="31" actId="1035"/>
       <pc:docMkLst>
         <pc:docMk/>
       </pc:docMkLst>
-      <pc:sldChg chg="modSp mod">
-        <pc:chgData name="Anatoliy Kigel" userId="7432c6c4687b0a9c" providerId="LiveId" clId="{2DBBE828-6D70-4F0D-9DD0-E666E70807B9}" dt="2021-02-02T21:44:42.244" v="2" actId="20577"/>
+      <pc:sldChg chg="del">
+        <pc:chgData name="Anatoliy Kigel" userId="7432c6c4687b0a9c" providerId="LiveId" clId="{9F95820F-F509-418B-82B8-792B22D34A7F}" dt="2022-05-30T16:54:17.691" v="0" actId="47"/>
         <pc:sldMkLst>
           <pc:docMk/>
-          <pc:sldMk cId="3139661526" sldId="261"/>
-        </pc:sldMkLst>
-        <pc:spChg chg="mod">
-          <ac:chgData name="Anatoliy Kigel" userId="7432c6c4687b0a9c" providerId="LiveId" clId="{2DBBE828-6D70-4F0D-9DD0-E666E70807B9}" dt="2021-02-02T21:44:42.244" v="2" actId="20577"/>
-          <ac:spMkLst>
-            <pc:docMk/>
-            <pc:sldMk cId="3139661526" sldId="261"/>
-            <ac:spMk id="2" creationId="{00000000-0000-0000-0000-000000000000}"/>
-          </ac:spMkLst>
-        </pc:spChg>
-      </pc:sldChg>
-      <pc:sldChg chg="add">
-        <pc:chgData name="Anatoliy Kigel" userId="7432c6c4687b0a9c" providerId="LiveId" clId="{2DBBE828-6D70-4F0D-9DD0-E666E70807B9}" dt="2021-02-02T13:04:18.196" v="1"/>
-        <pc:sldMkLst>
-          <pc:docMk/>
-          <pc:sldMk cId="867871601" sldId="285"/>
+          <pc:sldMk cId="3693897669" sldId="259"/>
         </pc:sldMkLst>
       </pc:sldChg>
-      <pc:sldChg chg="del">
-        <pc:chgData name="Anatoliy Kigel" userId="7432c6c4687b0a9c" providerId="LiveId" clId="{2DBBE828-6D70-4F0D-9DD0-E666E70807B9}" dt="2021-02-02T13:04:12.166" v="0" actId="2696"/>
-        <pc:sldMkLst>
-          <pc:docMk/>
-          <pc:sldMk cId="1102476631" sldId="285"/>
-        </pc:sldMkLst>
-      </pc:sldChg>
-      <pc:sldChg chg="del">
-        <pc:chgData name="Anatoliy Kigel" userId="7432c6c4687b0a9c" providerId="LiveId" clId="{2DBBE828-6D70-4F0D-9DD0-E666E70807B9}" dt="2021-02-02T13:04:12.166" v="0" actId="2696"/>
-        <pc:sldMkLst>
-          <pc:docMk/>
-          <pc:sldMk cId="1226791743" sldId="286"/>
-        </pc:sldMkLst>
-      </pc:sldChg>
-      <pc:sldChg chg="add">
-        <pc:chgData name="Anatoliy Kigel" userId="7432c6c4687b0a9c" providerId="LiveId" clId="{2DBBE828-6D70-4F0D-9DD0-E666E70807B9}" dt="2021-02-02T13:04:18.196" v="1"/>
-        <pc:sldMkLst>
-          <pc:docMk/>
-          <pc:sldMk cId="3162015940" sldId="286"/>
-        </pc:sldMkLst>
-      </pc:sldChg>
-    </pc:docChg>
-  </pc:docChgLst>
-  <pc:docChgLst>
-    <pc:chgData name="Anatoliy Kigel" userId="7432c6c4687b0a9c" providerId="LiveId" clId="{763D4391-3334-4BFD-872C-04389E7DFA5A}"/>
-    <pc:docChg chg="custSel delSld modSld modSection">
-      <pc:chgData name="Anatoliy Kigel" userId="7432c6c4687b0a9c" providerId="LiveId" clId="{763D4391-3334-4BFD-872C-04389E7DFA5A}" dt="2022-01-09T11:07:54.216" v="152" actId="1076"/>
-      <pc:docMkLst>
-        <pc:docMk/>
-      </pc:docMkLst>
       <pc:sldChg chg="modSp mod">
-        <pc:chgData name="Anatoliy Kigel" userId="7432c6c4687b0a9c" providerId="LiveId" clId="{763D4391-3334-4BFD-872C-04389E7DFA5A}" dt="2022-01-09T10:56:34.261" v="8" actId="20577"/>
+        <pc:chgData name="Anatoliy Kigel" userId="7432c6c4687b0a9c" providerId="LiveId" clId="{9F95820F-F509-418B-82B8-792B22D34A7F}" dt="2022-05-30T16:54:25.622" v="7" actId="20577"/>
         <pc:sldMkLst>
           <pc:docMk/>
           <pc:sldMk cId="3928218066" sldId="260"/>
         </pc:sldMkLst>
         <pc:spChg chg="mod">
-          <ac:chgData name="Anatoliy Kigel" userId="7432c6c4687b0a9c" providerId="LiveId" clId="{763D4391-3334-4BFD-872C-04389E7DFA5A}" dt="2022-01-09T10:56:30.104" v="1" actId="20577"/>
+          <ac:chgData name="Anatoliy Kigel" userId="7432c6c4687b0a9c" providerId="LiveId" clId="{9F95820F-F509-418B-82B8-792B22D34A7F}" dt="2022-05-30T16:54:20.599" v="2" actId="20577"/>
           <ac:spMkLst>
             <pc:docMk/>
             <pc:sldMk cId="3928218066" sldId="260"/>
@@ -287,7 +242,7 @@
           </ac:spMkLst>
         </pc:spChg>
         <pc:spChg chg="mod">
-          <ac:chgData name="Anatoliy Kigel" userId="7432c6c4687b0a9c" providerId="LiveId" clId="{763D4391-3334-4BFD-872C-04389E7DFA5A}" dt="2022-01-09T10:56:34.261" v="8" actId="20577"/>
+          <ac:chgData name="Anatoliy Kigel" userId="7432c6c4687b0a9c" providerId="LiveId" clId="{9F95820F-F509-418B-82B8-792B22D34A7F}" dt="2022-05-30T16:54:25.622" v="7" actId="20577"/>
           <ac:spMkLst>
             <pc:docMk/>
             <pc:sldMk cId="3928218066" sldId="260"/>
@@ -295,165 +250,98 @@
           </ac:spMkLst>
         </pc:spChg>
       </pc:sldChg>
-      <pc:sldChg chg="modSp mod">
-        <pc:chgData name="Anatoliy Kigel" userId="7432c6c4687b0a9c" providerId="LiveId" clId="{763D4391-3334-4BFD-872C-04389E7DFA5A}" dt="2022-01-09T11:06:14.117" v="130" actId="403"/>
+      <pc:sldChg chg="delSp modSp mod">
+        <pc:chgData name="Anatoliy Kigel" userId="7432c6c4687b0a9c" providerId="LiveId" clId="{9F95820F-F509-418B-82B8-792B22D34A7F}" dt="2022-06-01T06:46:33.404" v="31" actId="1035"/>
         <pc:sldMkLst>
           <pc:docMk/>
-          <pc:sldMk cId="551157161" sldId="263"/>
+          <pc:sldMk cId="1136467543" sldId="286"/>
         </pc:sldMkLst>
         <pc:spChg chg="mod">
-          <ac:chgData name="Anatoliy Kigel" userId="7432c6c4687b0a9c" providerId="LiveId" clId="{763D4391-3334-4BFD-872C-04389E7DFA5A}" dt="2022-01-09T11:06:14.117" v="130" actId="403"/>
+          <ac:chgData name="Anatoliy Kigel" userId="7432c6c4687b0a9c" providerId="LiveId" clId="{9F95820F-F509-418B-82B8-792B22D34A7F}" dt="2022-06-01T06:46:25.179" v="14" actId="1036"/>
           <ac:spMkLst>
             <pc:docMk/>
-            <pc:sldMk cId="551157161" sldId="263"/>
-            <ac:spMk id="4" creationId="{00000000-0000-0000-0000-000000000000}"/>
-          </ac:spMkLst>
-        </pc:spChg>
-      </pc:sldChg>
-      <pc:sldChg chg="addSp delSp modSp mod">
-        <pc:chgData name="Anatoliy Kigel" userId="7432c6c4687b0a9c" providerId="LiveId" clId="{763D4391-3334-4BFD-872C-04389E7DFA5A}" dt="2022-01-09T11:06:51.940" v="139" actId="1035"/>
-        <pc:sldMkLst>
-          <pc:docMk/>
-          <pc:sldMk cId="3430239916" sldId="264"/>
-        </pc:sldMkLst>
-        <pc:spChg chg="mod">
-          <ac:chgData name="Anatoliy Kigel" userId="7432c6c4687b0a9c" providerId="LiveId" clId="{763D4391-3334-4BFD-872C-04389E7DFA5A}" dt="2022-01-09T11:06:51.940" v="139" actId="1035"/>
-          <ac:spMkLst>
-            <pc:docMk/>
-            <pc:sldMk cId="3430239916" sldId="264"/>
+            <pc:sldMk cId="1136467543" sldId="286"/>
             <ac:spMk id="2" creationId="{00000000-0000-0000-0000-000000000000}"/>
           </ac:spMkLst>
         </pc:spChg>
-        <pc:spChg chg="del">
-          <ac:chgData name="Anatoliy Kigel" userId="7432c6c4687b0a9c" providerId="LiveId" clId="{763D4391-3334-4BFD-872C-04389E7DFA5A}" dt="2022-01-09T11:06:19.824" v="131" actId="478"/>
+        <pc:spChg chg="mod">
+          <ac:chgData name="Anatoliy Kigel" userId="7432c6c4687b0a9c" providerId="LiveId" clId="{9F95820F-F509-418B-82B8-792B22D34A7F}" dt="2022-06-01T06:46:32.254" v="28" actId="1036"/>
           <ac:spMkLst>
             <pc:docMk/>
-            <pc:sldMk cId="3430239916" sldId="264"/>
-            <ac:spMk id="3" creationId="{00000000-0000-0000-0000-000000000000}"/>
+            <pc:sldMk cId="1136467543" sldId="286"/>
+            <ac:spMk id="9" creationId="{00000000-0000-0000-0000-000000000000}"/>
           </ac:spMkLst>
         </pc:spChg>
-        <pc:spChg chg="add mod">
-          <ac:chgData name="Anatoliy Kigel" userId="7432c6c4687b0a9c" providerId="LiveId" clId="{763D4391-3334-4BFD-872C-04389E7DFA5A}" dt="2022-01-09T11:06:20.060" v="132"/>
+        <pc:spChg chg="del">
+          <ac:chgData name="Anatoliy Kigel" userId="7432c6c4687b0a9c" providerId="LiveId" clId="{9F95820F-F509-418B-82B8-792B22D34A7F}" dt="2022-06-01T06:46:23.378" v="9" actId="478"/>
           <ac:spMkLst>
             <pc:docMk/>
-            <pc:sldMk cId="3430239916" sldId="264"/>
-            <ac:spMk id="11" creationId="{92EF89CD-D3BC-47D8-BA34-9FA67D491868}"/>
+            <pc:sldMk cId="1136467543" sldId="286"/>
+            <ac:spMk id="12" creationId="{5EBB2F12-01F3-477A-AD10-E7A9F63E40B7}"/>
           </ac:spMkLst>
         </pc:spChg>
-        <pc:grpChg chg="mod">
-          <ac:chgData name="Anatoliy Kigel" userId="7432c6c4687b0a9c" providerId="LiveId" clId="{763D4391-3334-4BFD-872C-04389E7DFA5A}" dt="2022-01-09T11:06:49.757" v="135" actId="1035"/>
-          <ac:grpSpMkLst>
+        <pc:spChg chg="mod">
+          <ac:chgData name="Anatoliy Kigel" userId="7432c6c4687b0a9c" providerId="LiveId" clId="{9F95820F-F509-418B-82B8-792B22D34A7F}" dt="2022-06-01T06:46:33.404" v="31" actId="1035"/>
+          <ac:spMkLst>
             <pc:docMk/>
-            <pc:sldMk cId="3430239916" sldId="264"/>
-            <ac:grpSpMk id="5" creationId="{00000000-0000-0000-0000-000000000000}"/>
-          </ac:grpSpMkLst>
-        </pc:grpChg>
+            <pc:sldMk cId="1136467543" sldId="286"/>
+            <ac:spMk id="58" creationId="{00000000-0000-0000-0000-000000000000}"/>
+          </ac:spMkLst>
+        </pc:spChg>
+        <pc:spChg chg="mod">
+          <ac:chgData name="Anatoliy Kigel" userId="7432c6c4687b0a9c" providerId="LiveId" clId="{9F95820F-F509-418B-82B8-792B22D34A7F}" dt="2022-06-01T06:46:28.622" v="20" actId="1036"/>
+          <ac:spMkLst>
+            <pc:docMk/>
+            <pc:sldMk cId="1136467543" sldId="286"/>
+            <ac:spMk id="82" creationId="{00000000-0000-0000-0000-000000000000}"/>
+          </ac:spMkLst>
+        </pc:spChg>
+        <pc:spChg chg="mod">
+          <ac:chgData name="Anatoliy Kigel" userId="7432c6c4687b0a9c" providerId="LiveId" clId="{9F95820F-F509-418B-82B8-792B22D34A7F}" dt="2022-06-01T06:46:28.622" v="20" actId="1036"/>
+          <ac:spMkLst>
+            <pc:docMk/>
+            <pc:sldMk cId="1136467543" sldId="286"/>
+            <ac:spMk id="84" creationId="{00000000-0000-0000-0000-000000000000}"/>
+          </ac:spMkLst>
+        </pc:spChg>
+        <pc:spChg chg="mod">
+          <ac:chgData name="Anatoliy Kigel" userId="7432c6c4687b0a9c" providerId="LiveId" clId="{9F95820F-F509-418B-82B8-792B22D34A7F}" dt="2022-06-01T06:46:28.622" v="20" actId="1036"/>
+          <ac:spMkLst>
+            <pc:docMk/>
+            <pc:sldMk cId="1136467543" sldId="286"/>
+            <ac:spMk id="90" creationId="{00000000-0000-0000-0000-000000000000}"/>
+          </ac:spMkLst>
+        </pc:spChg>
         <pc:picChg chg="mod">
-          <ac:chgData name="Anatoliy Kigel" userId="7432c6c4687b0a9c" providerId="LiveId" clId="{763D4391-3334-4BFD-872C-04389E7DFA5A}" dt="2022-01-09T11:06:49.757" v="135" actId="1035"/>
+          <ac:chgData name="Anatoliy Kigel" userId="7432c6c4687b0a9c" providerId="LiveId" clId="{9F95820F-F509-418B-82B8-792B22D34A7F}" dt="2022-06-01T06:46:30.262" v="24" actId="1036"/>
           <ac:picMkLst>
             <pc:docMk/>
-            <pc:sldMk cId="3430239916" sldId="264"/>
-            <ac:picMk id="17" creationId="{00000000-0000-0000-0000-000000000000}"/>
+            <pc:sldMk cId="1136467543" sldId="286"/>
+            <ac:picMk id="25602" creationId="{00000000-0000-0000-0000-000000000000}"/>
           </ac:picMkLst>
         </pc:picChg>
         <pc:picChg chg="mod">
-          <ac:chgData name="Anatoliy Kigel" userId="7432c6c4687b0a9c" providerId="LiveId" clId="{763D4391-3334-4BFD-872C-04389E7DFA5A}" dt="2022-01-09T11:06:49.757" v="135" actId="1035"/>
+          <ac:chgData name="Anatoliy Kigel" userId="7432c6c4687b0a9c" providerId="LiveId" clId="{9F95820F-F509-418B-82B8-792B22D34A7F}" dt="2022-06-01T06:46:30.262" v="24" actId="1036"/>
           <ac:picMkLst>
             <pc:docMk/>
-            <pc:sldMk cId="3430239916" sldId="264"/>
-            <ac:picMk id="20" creationId="{00000000-0000-0000-0000-000000000000}"/>
+            <pc:sldMk cId="1136467543" sldId="286"/>
+            <ac:picMk id="25606" creationId="{00000000-0000-0000-0000-000000000000}"/>
           </ac:picMkLst>
         </pc:picChg>
       </pc:sldChg>
-      <pc:sldChg chg="modSp mod">
-        <pc:chgData name="Anatoliy Kigel" userId="7432c6c4687b0a9c" providerId="LiveId" clId="{763D4391-3334-4BFD-872C-04389E7DFA5A}" dt="2022-01-09T11:06:10.019" v="129" actId="1036"/>
+      <pc:sldChg chg="del">
+        <pc:chgData name="Anatoliy Kigel" userId="7432c6c4687b0a9c" providerId="LiveId" clId="{9F95820F-F509-418B-82B8-792B22D34A7F}" dt="2022-05-30T16:54:49.505" v="8" actId="47"/>
         <pc:sldMkLst>
           <pc:docMk/>
-          <pc:sldMk cId="2560431116" sldId="265"/>
-        </pc:sldMkLst>
-        <pc:spChg chg="mod">
-          <ac:chgData name="Anatoliy Kigel" userId="7432c6c4687b0a9c" providerId="LiveId" clId="{763D4391-3334-4BFD-872C-04389E7DFA5A}" dt="2022-01-09T11:05:50.139" v="121" actId="20577"/>
-          <ac:spMkLst>
-            <pc:docMk/>
-            <pc:sldMk cId="2560431116" sldId="265"/>
-            <ac:spMk id="5" creationId="{00000000-0000-0000-0000-000000000000}"/>
-          </ac:spMkLst>
-        </pc:spChg>
-        <pc:spChg chg="mod">
-          <ac:chgData name="Anatoliy Kigel" userId="7432c6c4687b0a9c" providerId="LiveId" clId="{763D4391-3334-4BFD-872C-04389E7DFA5A}" dt="2022-01-09T11:06:10.019" v="129" actId="1036"/>
-          <ac:spMkLst>
-            <pc:docMk/>
-            <pc:sldMk cId="2560431116" sldId="265"/>
-            <ac:spMk id="17" creationId="{00000000-0000-0000-0000-000000000000}"/>
-          </ac:spMkLst>
-        </pc:spChg>
-      </pc:sldChg>
-      <pc:sldChg chg="del">
-        <pc:chgData name="Anatoliy Kigel" userId="7432c6c4687b0a9c" providerId="LiveId" clId="{763D4391-3334-4BFD-872C-04389E7DFA5A}" dt="2022-01-09T10:57:18.542" v="18" actId="47"/>
-        <pc:sldMkLst>
-          <pc:docMk/>
-          <pc:sldMk cId="2595998150" sldId="266"/>
+          <pc:sldMk cId="17623490" sldId="296"/>
         </pc:sldMkLst>
       </pc:sldChg>
       <pc:sldChg chg="del">
-        <pc:chgData name="Anatoliy Kigel" userId="7432c6c4687b0a9c" providerId="LiveId" clId="{763D4391-3334-4BFD-872C-04389E7DFA5A}" dt="2022-01-09T10:57:18.542" v="18" actId="47"/>
-        <pc:sldMkLst>
-          <pc:docMk/>
-          <pc:sldMk cId="1206142669" sldId="267"/>
-        </pc:sldMkLst>
-      </pc:sldChg>
-      <pc:sldChg chg="del">
-        <pc:chgData name="Anatoliy Kigel" userId="7432c6c4687b0a9c" providerId="LiveId" clId="{763D4391-3334-4BFD-872C-04389E7DFA5A}" dt="2022-01-09T10:57:18.542" v="18" actId="47"/>
-        <pc:sldMkLst>
-          <pc:docMk/>
-          <pc:sldMk cId="1784252791" sldId="268"/>
-        </pc:sldMkLst>
-      </pc:sldChg>
-      <pc:sldChg chg="modSp mod">
-        <pc:chgData name="Anatoliy Kigel" userId="7432c6c4687b0a9c" providerId="LiveId" clId="{763D4391-3334-4BFD-872C-04389E7DFA5A}" dt="2022-01-09T11:07:54.216" v="152" actId="1076"/>
-        <pc:sldMkLst>
-          <pc:docMk/>
-          <pc:sldMk cId="3063730818" sldId="295"/>
-        </pc:sldMkLst>
-        <pc:spChg chg="mod">
-          <ac:chgData name="Anatoliy Kigel" userId="7432c6c4687b0a9c" providerId="LiveId" clId="{763D4391-3334-4BFD-872C-04389E7DFA5A}" dt="2022-01-09T11:07:50.382" v="147" actId="14100"/>
-          <ac:spMkLst>
-            <pc:docMk/>
-            <pc:sldMk cId="3063730818" sldId="295"/>
-            <ac:spMk id="3" creationId="{00000000-0000-0000-0000-000000000000}"/>
-          </ac:spMkLst>
-        </pc:spChg>
-        <pc:picChg chg="mod">
-          <ac:chgData name="Anatoliy Kigel" userId="7432c6c4687b0a9c" providerId="LiveId" clId="{763D4391-3334-4BFD-872C-04389E7DFA5A}" dt="2022-01-09T11:07:54.216" v="152" actId="1076"/>
-          <ac:picMkLst>
-            <pc:docMk/>
-            <pc:sldMk cId="3063730818" sldId="295"/>
-            <ac:picMk id="1026" creationId="{E98A6534-EC32-424A-B588-008EAFD5CF1D}"/>
-          </ac:picMkLst>
-        </pc:picChg>
-      </pc:sldChg>
-      <pc:sldChg chg="modSp mod">
-        <pc:chgData name="Anatoliy Kigel" userId="7432c6c4687b0a9c" providerId="LiveId" clId="{763D4391-3334-4BFD-872C-04389E7DFA5A}" dt="2022-01-09T10:56:45.841" v="17" actId="20577"/>
+        <pc:chgData name="Anatoliy Kigel" userId="7432c6c4687b0a9c" providerId="LiveId" clId="{9F95820F-F509-418B-82B8-792B22D34A7F}" dt="2022-05-30T16:54:49.505" v="8" actId="47"/>
         <pc:sldMkLst>
           <pc:docMk/>
           <pc:sldMk cId="599313642" sldId="302"/>
         </pc:sldMkLst>
-        <pc:spChg chg="mod">
-          <ac:chgData name="Anatoliy Kigel" userId="7432c6c4687b0a9c" providerId="LiveId" clId="{763D4391-3334-4BFD-872C-04389E7DFA5A}" dt="2022-01-09T10:56:42.130" v="10" actId="20577"/>
-          <ac:spMkLst>
-            <pc:docMk/>
-            <pc:sldMk cId="599313642" sldId="302"/>
-            <ac:spMk id="2" creationId="{00000000-0000-0000-0000-000000000000}"/>
-          </ac:spMkLst>
-        </pc:spChg>
-        <pc:spChg chg="mod">
-          <ac:chgData name="Anatoliy Kigel" userId="7432c6c4687b0a9c" providerId="LiveId" clId="{763D4391-3334-4BFD-872C-04389E7DFA5A}" dt="2022-01-09T10:56:45.841" v="17" actId="20577"/>
-          <ac:spMkLst>
-            <pc:docMk/>
-            <pc:sldMk cId="599313642" sldId="302"/>
-            <ac:spMk id="10" creationId="{00000000-0000-0000-0000-000000000000}"/>
-          </ac:spMkLst>
-        </pc:spChg>
       </pc:sldChg>
     </pc:docChg>
   </pc:docChgLst>
@@ -998,68 +886,6 @@
     </pc:docChg>
   </pc:docChgLst>
   <pc:docChgLst>
-    <pc:chgData name="Anatoliy Kigel" userId="7432c6c4687b0a9c" providerId="LiveId" clId="{811541E5-4FA4-4E7F-8C1A-E36EC8893D05}"/>
-    <pc:docChg chg="undo custSel addSld delSld modSld">
-      <pc:chgData name="Anatoliy Kigel" userId="7432c6c4687b0a9c" providerId="LiveId" clId="{811541E5-4FA4-4E7F-8C1A-E36EC8893D05}" dt="2021-05-07T11:13:20.286" v="30" actId="1076"/>
-      <pc:docMkLst>
-        <pc:docMk/>
-      </pc:docMkLst>
-      <pc:sldChg chg="modSp mod">
-        <pc:chgData name="Anatoliy Kigel" userId="7432c6c4687b0a9c" providerId="LiveId" clId="{811541E5-4FA4-4E7F-8C1A-E36EC8893D05}" dt="2021-05-07T11:12:55.476" v="7" actId="20577"/>
-        <pc:sldMkLst>
-          <pc:docMk/>
-          <pc:sldMk cId="3928218066" sldId="260"/>
-        </pc:sldMkLst>
-        <pc:spChg chg="mod">
-          <ac:chgData name="Anatoliy Kigel" userId="7432c6c4687b0a9c" providerId="LiveId" clId="{811541E5-4FA4-4E7F-8C1A-E36EC8893D05}" dt="2021-05-07T11:12:51.717" v="1" actId="20577"/>
-          <ac:spMkLst>
-            <pc:docMk/>
-            <pc:sldMk cId="3928218066" sldId="260"/>
-            <ac:spMk id="2" creationId="{00000000-0000-0000-0000-000000000000}"/>
-          </ac:spMkLst>
-        </pc:spChg>
-        <pc:spChg chg="mod">
-          <ac:chgData name="Anatoliy Kigel" userId="7432c6c4687b0a9c" providerId="LiveId" clId="{811541E5-4FA4-4E7F-8C1A-E36EC8893D05}" dt="2021-05-07T11:12:55.476" v="7" actId="20577"/>
-          <ac:spMkLst>
-            <pc:docMk/>
-            <pc:sldMk cId="3928218066" sldId="260"/>
-            <ac:spMk id="10" creationId="{00000000-0000-0000-0000-000000000000}"/>
-          </ac:spMkLst>
-        </pc:spChg>
-      </pc:sldChg>
-      <pc:sldChg chg="modSp mod">
-        <pc:chgData name="Anatoliy Kigel" userId="7432c6c4687b0a9c" providerId="LiveId" clId="{811541E5-4FA4-4E7F-8C1A-E36EC8893D05}" dt="2021-05-07T11:13:20.286" v="30" actId="1076"/>
-        <pc:sldMkLst>
-          <pc:docMk/>
-          <pc:sldMk cId="599313642" sldId="302"/>
-        </pc:sldMkLst>
-        <pc:spChg chg="mod">
-          <ac:chgData name="Anatoliy Kigel" userId="7432c6c4687b0a9c" providerId="LiveId" clId="{811541E5-4FA4-4E7F-8C1A-E36EC8893D05}" dt="2021-05-07T11:13:07.925" v="11" actId="20577"/>
-          <ac:spMkLst>
-            <pc:docMk/>
-            <pc:sldMk cId="599313642" sldId="302"/>
-            <ac:spMk id="2" creationId="{00000000-0000-0000-0000-000000000000}"/>
-          </ac:spMkLst>
-        </pc:spChg>
-        <pc:spChg chg="mod">
-          <ac:chgData name="Anatoliy Kigel" userId="7432c6c4687b0a9c" providerId="LiveId" clId="{811541E5-4FA4-4E7F-8C1A-E36EC8893D05}" dt="2021-05-07T11:13:20.286" v="30" actId="1076"/>
-          <ac:spMkLst>
-            <pc:docMk/>
-            <pc:sldMk cId="599313642" sldId="302"/>
-            <ac:spMk id="10" creationId="{00000000-0000-0000-0000-000000000000}"/>
-          </ac:spMkLst>
-        </pc:spChg>
-      </pc:sldChg>
-      <pc:sldChg chg="add del">
-        <pc:chgData name="Anatoliy Kigel" userId="7432c6c4687b0a9c" providerId="LiveId" clId="{811541E5-4FA4-4E7F-8C1A-E36EC8893D05}" dt="2021-05-07T11:13:04.816" v="9"/>
-        <pc:sldMkLst>
-          <pc:docMk/>
-          <pc:sldMk cId="2874574352" sldId="396"/>
-        </pc:sldMkLst>
-      </pc:sldChg>
-    </pc:docChg>
-  </pc:docChgLst>
-  <pc:docChgLst>
     <pc:chgData name="Anatoliy Kigel" userId="7432c6c4687b0a9c" providerId="LiveId" clId="{F41384BC-1466-49C1-AD56-815DF52AC4D0}"/>
     <pc:docChg chg="custSel addSld modSld modSection">
       <pc:chgData name="Anatoliy Kigel" userId="7432c6c4687b0a9c" providerId="LiveId" clId="{F41384BC-1466-49C1-AD56-815DF52AC4D0}" dt="2021-03-22T09:07:52.075" v="44" actId="478"/>
@@ -1153,51 +979,20 @@
     </pc:docChg>
   </pc:docChgLst>
   <pc:docChgLst>
-    <pc:chgData name="Anatoliy Kigel" userId="7432c6c4687b0a9c" providerId="LiveId" clId="{92A8ADEE-453E-4C6D-B3FD-6C87386FDB4C}"/>
-    <pc:docChg chg="delSld modSection">
-      <pc:chgData name="Anatoliy Kigel" userId="7432c6c4687b0a9c" providerId="LiveId" clId="{92A8ADEE-453E-4C6D-B3FD-6C87386FDB4C}" dt="2021-03-22T09:13:53.619" v="0" actId="47"/>
-      <pc:docMkLst>
-        <pc:docMk/>
-      </pc:docMkLst>
-      <pc:sldChg chg="del">
-        <pc:chgData name="Anatoliy Kigel" userId="7432c6c4687b0a9c" providerId="LiveId" clId="{92A8ADEE-453E-4C6D-B3FD-6C87386FDB4C}" dt="2021-03-22T09:13:53.619" v="0" actId="47"/>
-        <pc:sldMkLst>
-          <pc:docMk/>
-          <pc:sldMk cId="3410126731" sldId="396"/>
-        </pc:sldMkLst>
-      </pc:sldChg>
-    </pc:docChg>
-  </pc:docChgLst>
-  <pc:docChgLst>
-    <pc:chgData name="Anatoliy Kigel" userId="7432c6c4687b0a9c" providerId="LiveId" clId="{CC1D60BE-B53C-4A76-8698-CB4700C8A7F8}"/>
+    <pc:chgData name="Anatoliy Kigel" userId="7432c6c4687b0a9c" providerId="LiveId" clId="{073896AF-F8FF-4C0C-BE50-26F02D3F6483}"/>
     <pc:docChg chg="modSld">
-      <pc:chgData name="Anatoliy Kigel" userId="7432c6c4687b0a9c" providerId="LiveId" clId="{CC1D60BE-B53C-4A76-8698-CB4700C8A7F8}" dt="2021-09-30T17:08:54.877" v="52" actId="404"/>
+      <pc:chgData name="Anatoliy Kigel" userId="7432c6c4687b0a9c" providerId="LiveId" clId="{073896AF-F8FF-4C0C-BE50-26F02D3F6483}" dt="2021-08-31T09:56:08.126" v="27" actId="20577"/>
       <pc:docMkLst>
         <pc:docMk/>
       </pc:docMkLst>
       <pc:sldChg chg="modSp mod">
-        <pc:chgData name="Anatoliy Kigel" userId="7432c6c4687b0a9c" providerId="LiveId" clId="{CC1D60BE-B53C-4A76-8698-CB4700C8A7F8}" dt="2021-09-30T17:08:54.877" v="52" actId="404"/>
-        <pc:sldMkLst>
-          <pc:docMk/>
-          <pc:sldMk cId="0" sldId="257"/>
-        </pc:sldMkLst>
-        <pc:spChg chg="mod">
-          <ac:chgData name="Anatoliy Kigel" userId="7432c6c4687b0a9c" providerId="LiveId" clId="{CC1D60BE-B53C-4A76-8698-CB4700C8A7F8}" dt="2021-09-30T17:08:54.877" v="52" actId="404"/>
-          <ac:spMkLst>
-            <pc:docMk/>
-            <pc:sldMk cId="0" sldId="257"/>
-            <ac:spMk id="9" creationId="{00000000-0000-0000-0000-000000000000}"/>
-          </ac:spMkLst>
-        </pc:spChg>
-      </pc:sldChg>
-      <pc:sldChg chg="modSp mod">
-        <pc:chgData name="Anatoliy Kigel" userId="7432c6c4687b0a9c" providerId="LiveId" clId="{CC1D60BE-B53C-4A76-8698-CB4700C8A7F8}" dt="2021-09-25T11:17:04.717" v="5" actId="20577"/>
+        <pc:chgData name="Anatoliy Kigel" userId="7432c6c4687b0a9c" providerId="LiveId" clId="{073896AF-F8FF-4C0C-BE50-26F02D3F6483}" dt="2021-08-31T09:55:52.733" v="11" actId="20577"/>
         <pc:sldMkLst>
           <pc:docMk/>
           <pc:sldMk cId="3928218066" sldId="260"/>
         </pc:sldMkLst>
         <pc:spChg chg="mod">
-          <ac:chgData name="Anatoliy Kigel" userId="7432c6c4687b0a9c" providerId="LiveId" clId="{CC1D60BE-B53C-4A76-8698-CB4700C8A7F8}" dt="2021-09-25T11:17:01.780" v="0" actId="20577"/>
+          <ac:chgData name="Anatoliy Kigel" userId="7432c6c4687b0a9c" providerId="LiveId" clId="{073896AF-F8FF-4C0C-BE50-26F02D3F6483}" dt="2021-08-31T09:55:48.789" v="3" actId="20577"/>
           <ac:spMkLst>
             <pc:docMk/>
             <pc:sldMk cId="3928218066" sldId="260"/>
@@ -1205,7 +1000,7 @@
           </ac:spMkLst>
         </pc:spChg>
         <pc:spChg chg="mod">
-          <ac:chgData name="Anatoliy Kigel" userId="7432c6c4687b0a9c" providerId="LiveId" clId="{CC1D60BE-B53C-4A76-8698-CB4700C8A7F8}" dt="2021-09-25T11:17:04.717" v="5" actId="20577"/>
+          <ac:chgData name="Anatoliy Kigel" userId="7432c6c4687b0a9c" providerId="LiveId" clId="{073896AF-F8FF-4C0C-BE50-26F02D3F6483}" dt="2021-08-31T09:55:52.733" v="11" actId="20577"/>
           <ac:spMkLst>
             <pc:docMk/>
             <pc:sldMk cId="3928218066" sldId="260"/>
@@ -1214,13 +1009,13 @@
         </pc:spChg>
       </pc:sldChg>
       <pc:sldChg chg="modSp mod">
-        <pc:chgData name="Anatoliy Kigel" userId="7432c6c4687b0a9c" providerId="LiveId" clId="{CC1D60BE-B53C-4A76-8698-CB4700C8A7F8}" dt="2021-09-25T11:17:12.165" v="11" actId="20577"/>
+        <pc:chgData name="Anatoliy Kigel" userId="7432c6c4687b0a9c" providerId="LiveId" clId="{073896AF-F8FF-4C0C-BE50-26F02D3F6483}" dt="2021-08-31T09:56:08.126" v="27" actId="20577"/>
         <pc:sldMkLst>
           <pc:docMk/>
           <pc:sldMk cId="599313642" sldId="302"/>
         </pc:sldMkLst>
         <pc:spChg chg="mod">
-          <ac:chgData name="Anatoliy Kigel" userId="7432c6c4687b0a9c" providerId="LiveId" clId="{CC1D60BE-B53C-4A76-8698-CB4700C8A7F8}" dt="2021-09-25T11:17:09.282" v="6" actId="20577"/>
+          <ac:chgData name="Anatoliy Kigel" userId="7432c6c4687b0a9c" providerId="LiveId" clId="{073896AF-F8FF-4C0C-BE50-26F02D3F6483}" dt="2021-08-31T09:56:02.805" v="15" actId="20577"/>
           <ac:spMkLst>
             <pc:docMk/>
             <pc:sldMk cId="599313642" sldId="302"/>
@@ -1228,7 +1023,7 @@
           </ac:spMkLst>
         </pc:spChg>
         <pc:spChg chg="mod">
-          <ac:chgData name="Anatoliy Kigel" userId="7432c6c4687b0a9c" providerId="LiveId" clId="{CC1D60BE-B53C-4A76-8698-CB4700C8A7F8}" dt="2021-09-25T11:17:12.165" v="11" actId="20577"/>
+          <ac:chgData name="Anatoliy Kigel" userId="7432c6c4687b0a9c" providerId="LiveId" clId="{073896AF-F8FF-4C0C-BE50-26F02D3F6483}" dt="2021-08-31T09:56:08.126" v="27" actId="20577"/>
           <ac:spMkLst>
             <pc:docMk/>
             <pc:sldMk cId="599313642" sldId="302"/>
@@ -1239,189 +1034,54 @@
     </pc:docChg>
   </pc:docChgLst>
   <pc:docChgLst>
-    <pc:chgData name="Anatoliy Kigel" userId="7432c6c4687b0a9c" providerId="LiveId" clId="{9F95820F-F509-418B-82B8-792B22D34A7F}"/>
-    <pc:docChg chg="custSel delSld modSld modSection">
-      <pc:chgData name="Anatoliy Kigel" userId="7432c6c4687b0a9c" providerId="LiveId" clId="{9F95820F-F509-418B-82B8-792B22D34A7F}" dt="2022-06-01T06:46:33.404" v="31" actId="1035"/>
-      <pc:docMkLst>
-        <pc:docMk/>
-      </pc:docMkLst>
-      <pc:sldChg chg="del">
-        <pc:chgData name="Anatoliy Kigel" userId="7432c6c4687b0a9c" providerId="LiveId" clId="{9F95820F-F509-418B-82B8-792B22D34A7F}" dt="2022-05-30T16:54:17.691" v="0" actId="47"/>
-        <pc:sldMkLst>
-          <pc:docMk/>
-          <pc:sldMk cId="3693897669" sldId="259"/>
-        </pc:sldMkLst>
-      </pc:sldChg>
-      <pc:sldChg chg="modSp mod">
-        <pc:chgData name="Anatoliy Kigel" userId="7432c6c4687b0a9c" providerId="LiveId" clId="{9F95820F-F509-418B-82B8-792B22D34A7F}" dt="2022-05-30T16:54:25.622" v="7" actId="20577"/>
-        <pc:sldMkLst>
-          <pc:docMk/>
-          <pc:sldMk cId="3928218066" sldId="260"/>
-        </pc:sldMkLst>
-        <pc:spChg chg="mod">
-          <ac:chgData name="Anatoliy Kigel" userId="7432c6c4687b0a9c" providerId="LiveId" clId="{9F95820F-F509-418B-82B8-792B22D34A7F}" dt="2022-05-30T16:54:20.599" v="2" actId="20577"/>
-          <ac:spMkLst>
-            <pc:docMk/>
-            <pc:sldMk cId="3928218066" sldId="260"/>
-            <ac:spMk id="2" creationId="{00000000-0000-0000-0000-000000000000}"/>
-          </ac:spMkLst>
-        </pc:spChg>
-        <pc:spChg chg="mod">
-          <ac:chgData name="Anatoliy Kigel" userId="7432c6c4687b0a9c" providerId="LiveId" clId="{9F95820F-F509-418B-82B8-792B22D34A7F}" dt="2022-05-30T16:54:25.622" v="7" actId="20577"/>
-          <ac:spMkLst>
-            <pc:docMk/>
-            <pc:sldMk cId="3928218066" sldId="260"/>
-            <ac:spMk id="10" creationId="{00000000-0000-0000-0000-000000000000}"/>
-          </ac:spMkLst>
-        </pc:spChg>
-      </pc:sldChg>
-      <pc:sldChg chg="delSp modSp mod">
-        <pc:chgData name="Anatoliy Kigel" userId="7432c6c4687b0a9c" providerId="LiveId" clId="{9F95820F-F509-418B-82B8-792B22D34A7F}" dt="2022-06-01T06:46:33.404" v="31" actId="1035"/>
-        <pc:sldMkLst>
-          <pc:docMk/>
-          <pc:sldMk cId="1136467543" sldId="286"/>
-        </pc:sldMkLst>
-        <pc:spChg chg="mod">
-          <ac:chgData name="Anatoliy Kigel" userId="7432c6c4687b0a9c" providerId="LiveId" clId="{9F95820F-F509-418B-82B8-792B22D34A7F}" dt="2022-06-01T06:46:25.179" v="14" actId="1036"/>
-          <ac:spMkLst>
-            <pc:docMk/>
-            <pc:sldMk cId="1136467543" sldId="286"/>
-            <ac:spMk id="2" creationId="{00000000-0000-0000-0000-000000000000}"/>
-          </ac:spMkLst>
-        </pc:spChg>
-        <pc:spChg chg="mod">
-          <ac:chgData name="Anatoliy Kigel" userId="7432c6c4687b0a9c" providerId="LiveId" clId="{9F95820F-F509-418B-82B8-792B22D34A7F}" dt="2022-06-01T06:46:32.254" v="28" actId="1036"/>
-          <ac:spMkLst>
-            <pc:docMk/>
-            <pc:sldMk cId="1136467543" sldId="286"/>
-            <ac:spMk id="9" creationId="{00000000-0000-0000-0000-000000000000}"/>
-          </ac:spMkLst>
-        </pc:spChg>
-        <pc:spChg chg="del">
-          <ac:chgData name="Anatoliy Kigel" userId="7432c6c4687b0a9c" providerId="LiveId" clId="{9F95820F-F509-418B-82B8-792B22D34A7F}" dt="2022-06-01T06:46:23.378" v="9" actId="478"/>
-          <ac:spMkLst>
-            <pc:docMk/>
-            <pc:sldMk cId="1136467543" sldId="286"/>
-            <ac:spMk id="12" creationId="{5EBB2F12-01F3-477A-AD10-E7A9F63E40B7}"/>
-          </ac:spMkLst>
-        </pc:spChg>
-        <pc:spChg chg="mod">
-          <ac:chgData name="Anatoliy Kigel" userId="7432c6c4687b0a9c" providerId="LiveId" clId="{9F95820F-F509-418B-82B8-792B22D34A7F}" dt="2022-06-01T06:46:33.404" v="31" actId="1035"/>
-          <ac:spMkLst>
-            <pc:docMk/>
-            <pc:sldMk cId="1136467543" sldId="286"/>
-            <ac:spMk id="58" creationId="{00000000-0000-0000-0000-000000000000}"/>
-          </ac:spMkLst>
-        </pc:spChg>
-        <pc:spChg chg="mod">
-          <ac:chgData name="Anatoliy Kigel" userId="7432c6c4687b0a9c" providerId="LiveId" clId="{9F95820F-F509-418B-82B8-792B22D34A7F}" dt="2022-06-01T06:46:28.622" v="20" actId="1036"/>
-          <ac:spMkLst>
-            <pc:docMk/>
-            <pc:sldMk cId="1136467543" sldId="286"/>
-            <ac:spMk id="82" creationId="{00000000-0000-0000-0000-000000000000}"/>
-          </ac:spMkLst>
-        </pc:spChg>
-        <pc:spChg chg="mod">
-          <ac:chgData name="Anatoliy Kigel" userId="7432c6c4687b0a9c" providerId="LiveId" clId="{9F95820F-F509-418B-82B8-792B22D34A7F}" dt="2022-06-01T06:46:28.622" v="20" actId="1036"/>
-          <ac:spMkLst>
-            <pc:docMk/>
-            <pc:sldMk cId="1136467543" sldId="286"/>
-            <ac:spMk id="84" creationId="{00000000-0000-0000-0000-000000000000}"/>
-          </ac:spMkLst>
-        </pc:spChg>
-        <pc:spChg chg="mod">
-          <ac:chgData name="Anatoliy Kigel" userId="7432c6c4687b0a9c" providerId="LiveId" clId="{9F95820F-F509-418B-82B8-792B22D34A7F}" dt="2022-06-01T06:46:28.622" v="20" actId="1036"/>
-          <ac:spMkLst>
-            <pc:docMk/>
-            <pc:sldMk cId="1136467543" sldId="286"/>
-            <ac:spMk id="90" creationId="{00000000-0000-0000-0000-000000000000}"/>
-          </ac:spMkLst>
-        </pc:spChg>
-        <pc:picChg chg="mod">
-          <ac:chgData name="Anatoliy Kigel" userId="7432c6c4687b0a9c" providerId="LiveId" clId="{9F95820F-F509-418B-82B8-792B22D34A7F}" dt="2022-06-01T06:46:30.262" v="24" actId="1036"/>
-          <ac:picMkLst>
-            <pc:docMk/>
-            <pc:sldMk cId="1136467543" sldId="286"/>
-            <ac:picMk id="25602" creationId="{00000000-0000-0000-0000-000000000000}"/>
-          </ac:picMkLst>
-        </pc:picChg>
-        <pc:picChg chg="mod">
-          <ac:chgData name="Anatoliy Kigel" userId="7432c6c4687b0a9c" providerId="LiveId" clId="{9F95820F-F509-418B-82B8-792B22D34A7F}" dt="2022-06-01T06:46:30.262" v="24" actId="1036"/>
-          <ac:picMkLst>
-            <pc:docMk/>
-            <pc:sldMk cId="1136467543" sldId="286"/>
-            <ac:picMk id="25606" creationId="{00000000-0000-0000-0000-000000000000}"/>
-          </ac:picMkLst>
-        </pc:picChg>
-      </pc:sldChg>
-      <pc:sldChg chg="del">
-        <pc:chgData name="Anatoliy Kigel" userId="7432c6c4687b0a9c" providerId="LiveId" clId="{9F95820F-F509-418B-82B8-792B22D34A7F}" dt="2022-05-30T16:54:49.505" v="8" actId="47"/>
-        <pc:sldMkLst>
-          <pc:docMk/>
-          <pc:sldMk cId="17623490" sldId="296"/>
-        </pc:sldMkLst>
-      </pc:sldChg>
-      <pc:sldChg chg="del">
-        <pc:chgData name="Anatoliy Kigel" userId="7432c6c4687b0a9c" providerId="LiveId" clId="{9F95820F-F509-418B-82B8-792B22D34A7F}" dt="2022-05-30T16:54:49.505" v="8" actId="47"/>
-        <pc:sldMkLst>
-          <pc:docMk/>
-          <pc:sldMk cId="599313642" sldId="302"/>
-        </pc:sldMkLst>
-      </pc:sldChg>
-    </pc:docChg>
-  </pc:docChgLst>
-  <pc:docChgLst>
-    <pc:chgData name="Anatoliy Kigel" userId="7432c6c4687b0a9c" providerId="LiveId" clId="{CD4028F6-0983-40BE-96C5-7B3BCDB202FC}"/>
-    <pc:docChg chg="undo custSel modSld">
-      <pc:chgData name="Anatoliy Kigel" userId="7432c6c4687b0a9c" providerId="LiveId" clId="{CD4028F6-0983-40BE-96C5-7B3BCDB202FC}" dt="2021-06-28T17:30:49.388" v="19" actId="20577"/>
+    <pc:chgData name="Anatoliy Kigel" userId="7432c6c4687b0a9c" providerId="LiveId" clId="{2DBBE828-6D70-4F0D-9DD0-E666E70807B9}"/>
+    <pc:docChg chg="addSld delSld modSld modSection">
+      <pc:chgData name="Anatoliy Kigel" userId="7432c6c4687b0a9c" providerId="LiveId" clId="{2DBBE828-6D70-4F0D-9DD0-E666E70807B9}" dt="2021-02-02T21:44:42.244" v="2" actId="20577"/>
       <pc:docMkLst>
         <pc:docMk/>
       </pc:docMkLst>
       <pc:sldChg chg="modSp mod">
-        <pc:chgData name="Anatoliy Kigel" userId="7432c6c4687b0a9c" providerId="LiveId" clId="{CD4028F6-0983-40BE-96C5-7B3BCDB202FC}" dt="2021-06-28T17:30:38.434" v="12" actId="20577"/>
+        <pc:chgData name="Anatoliy Kigel" userId="7432c6c4687b0a9c" providerId="LiveId" clId="{2DBBE828-6D70-4F0D-9DD0-E666E70807B9}" dt="2021-02-02T21:44:42.244" v="2" actId="20577"/>
         <pc:sldMkLst>
           <pc:docMk/>
-          <pc:sldMk cId="3928218066" sldId="260"/>
+          <pc:sldMk cId="3139661526" sldId="261"/>
         </pc:sldMkLst>
         <pc:spChg chg="mod">
-          <ac:chgData name="Anatoliy Kigel" userId="7432c6c4687b0a9c" providerId="LiveId" clId="{CD4028F6-0983-40BE-96C5-7B3BCDB202FC}" dt="2021-06-28T17:30:30.463" v="1" actId="20577"/>
+          <ac:chgData name="Anatoliy Kigel" userId="7432c6c4687b0a9c" providerId="LiveId" clId="{2DBBE828-6D70-4F0D-9DD0-E666E70807B9}" dt="2021-02-02T21:44:42.244" v="2" actId="20577"/>
           <ac:spMkLst>
             <pc:docMk/>
-            <pc:sldMk cId="3928218066" sldId="260"/>
+            <pc:sldMk cId="3139661526" sldId="261"/>
             <ac:spMk id="2" creationId="{00000000-0000-0000-0000-000000000000}"/>
           </ac:spMkLst>
         </pc:spChg>
-        <pc:spChg chg="mod">
-          <ac:chgData name="Anatoliy Kigel" userId="7432c6c4687b0a9c" providerId="LiveId" clId="{CD4028F6-0983-40BE-96C5-7B3BCDB202FC}" dt="2021-06-28T17:30:38.434" v="12" actId="20577"/>
-          <ac:spMkLst>
-            <pc:docMk/>
-            <pc:sldMk cId="3928218066" sldId="260"/>
-            <ac:spMk id="10" creationId="{00000000-0000-0000-0000-000000000000}"/>
-          </ac:spMkLst>
-        </pc:spChg>
       </pc:sldChg>
-      <pc:sldChg chg="modSp mod">
-        <pc:chgData name="Anatoliy Kigel" userId="7432c6c4687b0a9c" providerId="LiveId" clId="{CD4028F6-0983-40BE-96C5-7B3BCDB202FC}" dt="2021-06-28T17:30:49.388" v="19" actId="20577"/>
+      <pc:sldChg chg="add">
+        <pc:chgData name="Anatoliy Kigel" userId="7432c6c4687b0a9c" providerId="LiveId" clId="{2DBBE828-6D70-4F0D-9DD0-E666E70807B9}" dt="2021-02-02T13:04:18.196" v="1"/>
         <pc:sldMkLst>
           <pc:docMk/>
-          <pc:sldMk cId="599313642" sldId="302"/>
+          <pc:sldMk cId="867871601" sldId="285"/>
         </pc:sldMkLst>
-        <pc:spChg chg="mod">
-          <ac:chgData name="Anatoliy Kigel" userId="7432c6c4687b0a9c" providerId="LiveId" clId="{CD4028F6-0983-40BE-96C5-7B3BCDB202FC}" dt="2021-06-28T17:30:45.772" v="14" actId="20577"/>
-          <ac:spMkLst>
-            <pc:docMk/>
-            <pc:sldMk cId="599313642" sldId="302"/>
-            <ac:spMk id="2" creationId="{00000000-0000-0000-0000-000000000000}"/>
-          </ac:spMkLst>
-        </pc:spChg>
-        <pc:spChg chg="mod">
-          <ac:chgData name="Anatoliy Kigel" userId="7432c6c4687b0a9c" providerId="LiveId" clId="{CD4028F6-0983-40BE-96C5-7B3BCDB202FC}" dt="2021-06-28T17:30:49.388" v="19" actId="20577"/>
-          <ac:spMkLst>
-            <pc:docMk/>
-            <pc:sldMk cId="599313642" sldId="302"/>
-            <ac:spMk id="10" creationId="{00000000-0000-0000-0000-000000000000}"/>
-          </ac:spMkLst>
-        </pc:spChg>
+      </pc:sldChg>
+      <pc:sldChg chg="del">
+        <pc:chgData name="Anatoliy Kigel" userId="7432c6c4687b0a9c" providerId="LiveId" clId="{2DBBE828-6D70-4F0D-9DD0-E666E70807B9}" dt="2021-02-02T13:04:12.166" v="0" actId="2696"/>
+        <pc:sldMkLst>
+          <pc:docMk/>
+          <pc:sldMk cId="1102476631" sldId="285"/>
+        </pc:sldMkLst>
+      </pc:sldChg>
+      <pc:sldChg chg="del">
+        <pc:chgData name="Anatoliy Kigel" userId="7432c6c4687b0a9c" providerId="LiveId" clId="{2DBBE828-6D70-4F0D-9DD0-E666E70807B9}" dt="2021-02-02T13:04:12.166" v="0" actId="2696"/>
+        <pc:sldMkLst>
+          <pc:docMk/>
+          <pc:sldMk cId="1226791743" sldId="286"/>
+        </pc:sldMkLst>
+      </pc:sldChg>
+      <pc:sldChg chg="add">
+        <pc:chgData name="Anatoliy Kigel" userId="7432c6c4687b0a9c" providerId="LiveId" clId="{2DBBE828-6D70-4F0D-9DD0-E666E70807B9}" dt="2021-02-02T13:04:18.196" v="1"/>
+        <pc:sldMkLst>
+          <pc:docMk/>
+          <pc:sldMk cId="3162015940" sldId="286"/>
+        </pc:sldMkLst>
       </pc:sldChg>
     </pc:docChg>
   </pc:docChgLst>
@@ -1497,20 +1157,44 @@
     </pc:docChg>
   </pc:docChgLst>
   <pc:docChgLst>
-    <pc:chgData name="Anatoliy Kigel" userId="7432c6c4687b0a9c" providerId="LiveId" clId="{073896AF-F8FF-4C0C-BE50-26F02D3F6483}"/>
+    <pc:chgData name="Anatoliy Kigel" userId="7432c6c4687b0a9c" providerId="LiveId" clId="{BAE25142-3F58-497C-947C-2BC92FA6FA95}"/>
     <pc:docChg chg="modSld">
-      <pc:chgData name="Anatoliy Kigel" userId="7432c6c4687b0a9c" providerId="LiveId" clId="{073896AF-F8FF-4C0C-BE50-26F02D3F6483}" dt="2021-08-31T09:56:08.126" v="27" actId="20577"/>
+      <pc:chgData name="Anatoliy Kigel" userId="7432c6c4687b0a9c" providerId="LiveId" clId="{BAE25142-3F58-497C-947C-2BC92FA6FA95}" dt="2022-06-02T18:30:40.890" v="0"/>
       <pc:docMkLst>
         <pc:docMk/>
       </pc:docMkLst>
       <pc:sldChg chg="modSp mod">
-        <pc:chgData name="Anatoliy Kigel" userId="7432c6c4687b0a9c" providerId="LiveId" clId="{073896AF-F8FF-4C0C-BE50-26F02D3F6483}" dt="2021-08-31T09:55:52.733" v="11" actId="20577"/>
+        <pc:chgData name="Anatoliy Kigel" userId="7432c6c4687b0a9c" providerId="LiveId" clId="{BAE25142-3F58-497C-947C-2BC92FA6FA95}" dt="2022-06-02T18:30:40.890" v="0"/>
+        <pc:sldMkLst>
+          <pc:docMk/>
+          <pc:sldMk cId="2134033093" sldId="290"/>
+        </pc:sldMkLst>
+        <pc:spChg chg="mod">
+          <ac:chgData name="Anatoliy Kigel" userId="7432c6c4687b0a9c" providerId="LiveId" clId="{BAE25142-3F58-497C-947C-2BC92FA6FA95}" dt="2022-06-02T18:30:40.890" v="0"/>
+          <ac:spMkLst>
+            <pc:docMk/>
+            <pc:sldMk cId="2134033093" sldId="290"/>
+            <ac:spMk id="7" creationId="{00000000-0000-0000-0000-000000000000}"/>
+          </ac:spMkLst>
+        </pc:spChg>
+      </pc:sldChg>
+    </pc:docChg>
+  </pc:docChgLst>
+  <pc:docChgLst>
+    <pc:chgData name="Anatoliy Kigel" userId="7432c6c4687b0a9c" providerId="LiveId" clId="{763D4391-3334-4BFD-872C-04389E7DFA5A}"/>
+    <pc:docChg chg="custSel delSld modSld modSection">
+      <pc:chgData name="Anatoliy Kigel" userId="7432c6c4687b0a9c" providerId="LiveId" clId="{763D4391-3334-4BFD-872C-04389E7DFA5A}" dt="2022-01-09T11:07:54.216" v="152" actId="1076"/>
+      <pc:docMkLst>
+        <pc:docMk/>
+      </pc:docMkLst>
+      <pc:sldChg chg="modSp mod">
+        <pc:chgData name="Anatoliy Kigel" userId="7432c6c4687b0a9c" providerId="LiveId" clId="{763D4391-3334-4BFD-872C-04389E7DFA5A}" dt="2022-01-09T10:56:34.261" v="8" actId="20577"/>
         <pc:sldMkLst>
           <pc:docMk/>
           <pc:sldMk cId="3928218066" sldId="260"/>
         </pc:sldMkLst>
         <pc:spChg chg="mod">
-          <ac:chgData name="Anatoliy Kigel" userId="7432c6c4687b0a9c" providerId="LiveId" clId="{073896AF-F8FF-4C0C-BE50-26F02D3F6483}" dt="2021-08-31T09:55:48.789" v="3" actId="20577"/>
+          <ac:chgData name="Anatoliy Kigel" userId="7432c6c4687b0a9c" providerId="LiveId" clId="{763D4391-3334-4BFD-872C-04389E7DFA5A}" dt="2022-01-09T10:56:30.104" v="1" actId="20577"/>
           <ac:spMkLst>
             <pc:docMk/>
             <pc:sldMk cId="3928218066" sldId="260"/>
@@ -1518,7 +1202,7 @@
           </ac:spMkLst>
         </pc:spChg>
         <pc:spChg chg="mod">
-          <ac:chgData name="Anatoliy Kigel" userId="7432c6c4687b0a9c" providerId="LiveId" clId="{073896AF-F8FF-4C0C-BE50-26F02D3F6483}" dt="2021-08-31T09:55:52.733" v="11" actId="20577"/>
+          <ac:chgData name="Anatoliy Kigel" userId="7432c6c4687b0a9c" providerId="LiveId" clId="{763D4391-3334-4BFD-872C-04389E7DFA5A}" dt="2022-01-09T10:56:34.261" v="8" actId="20577"/>
           <ac:spMkLst>
             <pc:docMk/>
             <pc:sldMk cId="3928218066" sldId="260"/>
@@ -1527,13 +1211,150 @@
         </pc:spChg>
       </pc:sldChg>
       <pc:sldChg chg="modSp mod">
-        <pc:chgData name="Anatoliy Kigel" userId="7432c6c4687b0a9c" providerId="LiveId" clId="{073896AF-F8FF-4C0C-BE50-26F02D3F6483}" dt="2021-08-31T09:56:08.126" v="27" actId="20577"/>
+        <pc:chgData name="Anatoliy Kigel" userId="7432c6c4687b0a9c" providerId="LiveId" clId="{763D4391-3334-4BFD-872C-04389E7DFA5A}" dt="2022-01-09T11:06:14.117" v="130" actId="403"/>
+        <pc:sldMkLst>
+          <pc:docMk/>
+          <pc:sldMk cId="551157161" sldId="263"/>
+        </pc:sldMkLst>
+        <pc:spChg chg="mod">
+          <ac:chgData name="Anatoliy Kigel" userId="7432c6c4687b0a9c" providerId="LiveId" clId="{763D4391-3334-4BFD-872C-04389E7DFA5A}" dt="2022-01-09T11:06:14.117" v="130" actId="403"/>
+          <ac:spMkLst>
+            <pc:docMk/>
+            <pc:sldMk cId="551157161" sldId="263"/>
+            <ac:spMk id="4" creationId="{00000000-0000-0000-0000-000000000000}"/>
+          </ac:spMkLst>
+        </pc:spChg>
+      </pc:sldChg>
+      <pc:sldChg chg="addSp delSp modSp mod">
+        <pc:chgData name="Anatoliy Kigel" userId="7432c6c4687b0a9c" providerId="LiveId" clId="{763D4391-3334-4BFD-872C-04389E7DFA5A}" dt="2022-01-09T11:06:51.940" v="139" actId="1035"/>
+        <pc:sldMkLst>
+          <pc:docMk/>
+          <pc:sldMk cId="3430239916" sldId="264"/>
+        </pc:sldMkLst>
+        <pc:spChg chg="mod">
+          <ac:chgData name="Anatoliy Kigel" userId="7432c6c4687b0a9c" providerId="LiveId" clId="{763D4391-3334-4BFD-872C-04389E7DFA5A}" dt="2022-01-09T11:06:51.940" v="139" actId="1035"/>
+          <ac:spMkLst>
+            <pc:docMk/>
+            <pc:sldMk cId="3430239916" sldId="264"/>
+            <ac:spMk id="2" creationId="{00000000-0000-0000-0000-000000000000}"/>
+          </ac:spMkLst>
+        </pc:spChg>
+        <pc:spChg chg="del">
+          <ac:chgData name="Anatoliy Kigel" userId="7432c6c4687b0a9c" providerId="LiveId" clId="{763D4391-3334-4BFD-872C-04389E7DFA5A}" dt="2022-01-09T11:06:19.824" v="131" actId="478"/>
+          <ac:spMkLst>
+            <pc:docMk/>
+            <pc:sldMk cId="3430239916" sldId="264"/>
+            <ac:spMk id="3" creationId="{00000000-0000-0000-0000-000000000000}"/>
+          </ac:spMkLst>
+        </pc:spChg>
+        <pc:spChg chg="add mod">
+          <ac:chgData name="Anatoliy Kigel" userId="7432c6c4687b0a9c" providerId="LiveId" clId="{763D4391-3334-4BFD-872C-04389E7DFA5A}" dt="2022-01-09T11:06:20.060" v="132"/>
+          <ac:spMkLst>
+            <pc:docMk/>
+            <pc:sldMk cId="3430239916" sldId="264"/>
+            <ac:spMk id="11" creationId="{92EF89CD-D3BC-47D8-BA34-9FA67D491868}"/>
+          </ac:spMkLst>
+        </pc:spChg>
+        <pc:grpChg chg="mod">
+          <ac:chgData name="Anatoliy Kigel" userId="7432c6c4687b0a9c" providerId="LiveId" clId="{763D4391-3334-4BFD-872C-04389E7DFA5A}" dt="2022-01-09T11:06:49.757" v="135" actId="1035"/>
+          <ac:grpSpMkLst>
+            <pc:docMk/>
+            <pc:sldMk cId="3430239916" sldId="264"/>
+            <ac:grpSpMk id="5" creationId="{00000000-0000-0000-0000-000000000000}"/>
+          </ac:grpSpMkLst>
+        </pc:grpChg>
+        <pc:picChg chg="mod">
+          <ac:chgData name="Anatoliy Kigel" userId="7432c6c4687b0a9c" providerId="LiveId" clId="{763D4391-3334-4BFD-872C-04389E7DFA5A}" dt="2022-01-09T11:06:49.757" v="135" actId="1035"/>
+          <ac:picMkLst>
+            <pc:docMk/>
+            <pc:sldMk cId="3430239916" sldId="264"/>
+            <ac:picMk id="17" creationId="{00000000-0000-0000-0000-000000000000}"/>
+          </ac:picMkLst>
+        </pc:picChg>
+        <pc:picChg chg="mod">
+          <ac:chgData name="Anatoliy Kigel" userId="7432c6c4687b0a9c" providerId="LiveId" clId="{763D4391-3334-4BFD-872C-04389E7DFA5A}" dt="2022-01-09T11:06:49.757" v="135" actId="1035"/>
+          <ac:picMkLst>
+            <pc:docMk/>
+            <pc:sldMk cId="3430239916" sldId="264"/>
+            <ac:picMk id="20" creationId="{00000000-0000-0000-0000-000000000000}"/>
+          </ac:picMkLst>
+        </pc:picChg>
+      </pc:sldChg>
+      <pc:sldChg chg="modSp mod">
+        <pc:chgData name="Anatoliy Kigel" userId="7432c6c4687b0a9c" providerId="LiveId" clId="{763D4391-3334-4BFD-872C-04389E7DFA5A}" dt="2022-01-09T11:06:10.019" v="129" actId="1036"/>
+        <pc:sldMkLst>
+          <pc:docMk/>
+          <pc:sldMk cId="2560431116" sldId="265"/>
+        </pc:sldMkLst>
+        <pc:spChg chg="mod">
+          <ac:chgData name="Anatoliy Kigel" userId="7432c6c4687b0a9c" providerId="LiveId" clId="{763D4391-3334-4BFD-872C-04389E7DFA5A}" dt="2022-01-09T11:05:50.139" v="121" actId="20577"/>
+          <ac:spMkLst>
+            <pc:docMk/>
+            <pc:sldMk cId="2560431116" sldId="265"/>
+            <ac:spMk id="5" creationId="{00000000-0000-0000-0000-000000000000}"/>
+          </ac:spMkLst>
+        </pc:spChg>
+        <pc:spChg chg="mod">
+          <ac:chgData name="Anatoliy Kigel" userId="7432c6c4687b0a9c" providerId="LiveId" clId="{763D4391-3334-4BFD-872C-04389E7DFA5A}" dt="2022-01-09T11:06:10.019" v="129" actId="1036"/>
+          <ac:spMkLst>
+            <pc:docMk/>
+            <pc:sldMk cId="2560431116" sldId="265"/>
+            <ac:spMk id="17" creationId="{00000000-0000-0000-0000-000000000000}"/>
+          </ac:spMkLst>
+        </pc:spChg>
+      </pc:sldChg>
+      <pc:sldChg chg="del">
+        <pc:chgData name="Anatoliy Kigel" userId="7432c6c4687b0a9c" providerId="LiveId" clId="{763D4391-3334-4BFD-872C-04389E7DFA5A}" dt="2022-01-09T10:57:18.542" v="18" actId="47"/>
+        <pc:sldMkLst>
+          <pc:docMk/>
+          <pc:sldMk cId="2595998150" sldId="266"/>
+        </pc:sldMkLst>
+      </pc:sldChg>
+      <pc:sldChg chg="del">
+        <pc:chgData name="Anatoliy Kigel" userId="7432c6c4687b0a9c" providerId="LiveId" clId="{763D4391-3334-4BFD-872C-04389E7DFA5A}" dt="2022-01-09T10:57:18.542" v="18" actId="47"/>
+        <pc:sldMkLst>
+          <pc:docMk/>
+          <pc:sldMk cId="1206142669" sldId="267"/>
+        </pc:sldMkLst>
+      </pc:sldChg>
+      <pc:sldChg chg="del">
+        <pc:chgData name="Anatoliy Kigel" userId="7432c6c4687b0a9c" providerId="LiveId" clId="{763D4391-3334-4BFD-872C-04389E7DFA5A}" dt="2022-01-09T10:57:18.542" v="18" actId="47"/>
+        <pc:sldMkLst>
+          <pc:docMk/>
+          <pc:sldMk cId="1784252791" sldId="268"/>
+        </pc:sldMkLst>
+      </pc:sldChg>
+      <pc:sldChg chg="modSp mod">
+        <pc:chgData name="Anatoliy Kigel" userId="7432c6c4687b0a9c" providerId="LiveId" clId="{763D4391-3334-4BFD-872C-04389E7DFA5A}" dt="2022-01-09T11:07:54.216" v="152" actId="1076"/>
+        <pc:sldMkLst>
+          <pc:docMk/>
+          <pc:sldMk cId="3063730818" sldId="295"/>
+        </pc:sldMkLst>
+        <pc:spChg chg="mod">
+          <ac:chgData name="Anatoliy Kigel" userId="7432c6c4687b0a9c" providerId="LiveId" clId="{763D4391-3334-4BFD-872C-04389E7DFA5A}" dt="2022-01-09T11:07:50.382" v="147" actId="14100"/>
+          <ac:spMkLst>
+            <pc:docMk/>
+            <pc:sldMk cId="3063730818" sldId="295"/>
+            <ac:spMk id="3" creationId="{00000000-0000-0000-0000-000000000000}"/>
+          </ac:spMkLst>
+        </pc:spChg>
+        <pc:picChg chg="mod">
+          <ac:chgData name="Anatoliy Kigel" userId="7432c6c4687b0a9c" providerId="LiveId" clId="{763D4391-3334-4BFD-872C-04389E7DFA5A}" dt="2022-01-09T11:07:54.216" v="152" actId="1076"/>
+          <ac:picMkLst>
+            <pc:docMk/>
+            <pc:sldMk cId="3063730818" sldId="295"/>
+            <ac:picMk id="1026" creationId="{E98A6534-EC32-424A-B588-008EAFD5CF1D}"/>
+          </ac:picMkLst>
+        </pc:picChg>
+      </pc:sldChg>
+      <pc:sldChg chg="modSp mod">
+        <pc:chgData name="Anatoliy Kigel" userId="7432c6c4687b0a9c" providerId="LiveId" clId="{763D4391-3334-4BFD-872C-04389E7DFA5A}" dt="2022-01-09T10:56:45.841" v="17" actId="20577"/>
         <pc:sldMkLst>
           <pc:docMk/>
           <pc:sldMk cId="599313642" sldId="302"/>
         </pc:sldMkLst>
         <pc:spChg chg="mod">
-          <ac:chgData name="Anatoliy Kigel" userId="7432c6c4687b0a9c" providerId="LiveId" clId="{073896AF-F8FF-4C0C-BE50-26F02D3F6483}" dt="2021-08-31T09:56:02.805" v="15" actId="20577"/>
+          <ac:chgData name="Anatoliy Kigel" userId="7432c6c4687b0a9c" providerId="LiveId" clId="{763D4391-3334-4BFD-872C-04389E7DFA5A}" dt="2022-01-09T10:56:42.130" v="10" actId="20577"/>
           <ac:spMkLst>
             <pc:docMk/>
             <pc:sldMk cId="599313642" sldId="302"/>
@@ -1541,7 +1362,7 @@
           </ac:spMkLst>
         </pc:spChg>
         <pc:spChg chg="mod">
-          <ac:chgData name="Anatoliy Kigel" userId="7432c6c4687b0a9c" providerId="LiveId" clId="{073896AF-F8FF-4C0C-BE50-26F02D3F6483}" dt="2021-08-31T09:56:08.126" v="27" actId="20577"/>
+          <ac:chgData name="Anatoliy Kigel" userId="7432c6c4687b0a9c" providerId="LiveId" clId="{763D4391-3334-4BFD-872C-04389E7DFA5A}" dt="2022-01-09T10:56:45.841" v="17" actId="20577"/>
           <ac:spMkLst>
             <pc:docMk/>
             <pc:sldMk cId="599313642" sldId="302"/>
@@ -1687,6 +1508,209 @@
       </pc:sldChg>
     </pc:docChg>
   </pc:docChgLst>
+  <pc:docChgLst>
+    <pc:chgData name="Anatoliy Kigel" userId="7432c6c4687b0a9c" providerId="LiveId" clId="{CC1D60BE-B53C-4A76-8698-CB4700C8A7F8}"/>
+    <pc:docChg chg="modSld">
+      <pc:chgData name="Anatoliy Kigel" userId="7432c6c4687b0a9c" providerId="LiveId" clId="{CC1D60BE-B53C-4A76-8698-CB4700C8A7F8}" dt="2021-09-30T17:08:54.877" v="52" actId="404"/>
+      <pc:docMkLst>
+        <pc:docMk/>
+      </pc:docMkLst>
+      <pc:sldChg chg="modSp mod">
+        <pc:chgData name="Anatoliy Kigel" userId="7432c6c4687b0a9c" providerId="LiveId" clId="{CC1D60BE-B53C-4A76-8698-CB4700C8A7F8}" dt="2021-09-30T17:08:54.877" v="52" actId="404"/>
+        <pc:sldMkLst>
+          <pc:docMk/>
+          <pc:sldMk cId="0" sldId="257"/>
+        </pc:sldMkLst>
+        <pc:spChg chg="mod">
+          <ac:chgData name="Anatoliy Kigel" userId="7432c6c4687b0a9c" providerId="LiveId" clId="{CC1D60BE-B53C-4A76-8698-CB4700C8A7F8}" dt="2021-09-30T17:08:54.877" v="52" actId="404"/>
+          <ac:spMkLst>
+            <pc:docMk/>
+            <pc:sldMk cId="0" sldId="257"/>
+            <ac:spMk id="9" creationId="{00000000-0000-0000-0000-000000000000}"/>
+          </ac:spMkLst>
+        </pc:spChg>
+      </pc:sldChg>
+      <pc:sldChg chg="modSp mod">
+        <pc:chgData name="Anatoliy Kigel" userId="7432c6c4687b0a9c" providerId="LiveId" clId="{CC1D60BE-B53C-4A76-8698-CB4700C8A7F8}" dt="2021-09-25T11:17:04.717" v="5" actId="20577"/>
+        <pc:sldMkLst>
+          <pc:docMk/>
+          <pc:sldMk cId="3928218066" sldId="260"/>
+        </pc:sldMkLst>
+        <pc:spChg chg="mod">
+          <ac:chgData name="Anatoliy Kigel" userId="7432c6c4687b0a9c" providerId="LiveId" clId="{CC1D60BE-B53C-4A76-8698-CB4700C8A7F8}" dt="2021-09-25T11:17:01.780" v="0" actId="20577"/>
+          <ac:spMkLst>
+            <pc:docMk/>
+            <pc:sldMk cId="3928218066" sldId="260"/>
+            <ac:spMk id="2" creationId="{00000000-0000-0000-0000-000000000000}"/>
+          </ac:spMkLst>
+        </pc:spChg>
+        <pc:spChg chg="mod">
+          <ac:chgData name="Anatoliy Kigel" userId="7432c6c4687b0a9c" providerId="LiveId" clId="{CC1D60BE-B53C-4A76-8698-CB4700C8A7F8}" dt="2021-09-25T11:17:04.717" v="5" actId="20577"/>
+          <ac:spMkLst>
+            <pc:docMk/>
+            <pc:sldMk cId="3928218066" sldId="260"/>
+            <ac:spMk id="10" creationId="{00000000-0000-0000-0000-000000000000}"/>
+          </ac:spMkLst>
+        </pc:spChg>
+      </pc:sldChg>
+      <pc:sldChg chg="modSp mod">
+        <pc:chgData name="Anatoliy Kigel" userId="7432c6c4687b0a9c" providerId="LiveId" clId="{CC1D60BE-B53C-4A76-8698-CB4700C8A7F8}" dt="2021-09-25T11:17:12.165" v="11" actId="20577"/>
+        <pc:sldMkLst>
+          <pc:docMk/>
+          <pc:sldMk cId="599313642" sldId="302"/>
+        </pc:sldMkLst>
+        <pc:spChg chg="mod">
+          <ac:chgData name="Anatoliy Kigel" userId="7432c6c4687b0a9c" providerId="LiveId" clId="{CC1D60BE-B53C-4A76-8698-CB4700C8A7F8}" dt="2021-09-25T11:17:09.282" v="6" actId="20577"/>
+          <ac:spMkLst>
+            <pc:docMk/>
+            <pc:sldMk cId="599313642" sldId="302"/>
+            <ac:spMk id="2" creationId="{00000000-0000-0000-0000-000000000000}"/>
+          </ac:spMkLst>
+        </pc:spChg>
+        <pc:spChg chg="mod">
+          <ac:chgData name="Anatoliy Kigel" userId="7432c6c4687b0a9c" providerId="LiveId" clId="{CC1D60BE-B53C-4A76-8698-CB4700C8A7F8}" dt="2021-09-25T11:17:12.165" v="11" actId="20577"/>
+          <ac:spMkLst>
+            <pc:docMk/>
+            <pc:sldMk cId="599313642" sldId="302"/>
+            <ac:spMk id="10" creationId="{00000000-0000-0000-0000-000000000000}"/>
+          </ac:spMkLst>
+        </pc:spChg>
+      </pc:sldChg>
+    </pc:docChg>
+  </pc:docChgLst>
+  <pc:docChgLst>
+    <pc:chgData name="Anatoliy Kigel" userId="7432c6c4687b0a9c" providerId="LiveId" clId="{CD4028F6-0983-40BE-96C5-7B3BCDB202FC}"/>
+    <pc:docChg chg="undo custSel modSld">
+      <pc:chgData name="Anatoliy Kigel" userId="7432c6c4687b0a9c" providerId="LiveId" clId="{CD4028F6-0983-40BE-96C5-7B3BCDB202FC}" dt="2021-06-28T17:30:49.388" v="19" actId="20577"/>
+      <pc:docMkLst>
+        <pc:docMk/>
+      </pc:docMkLst>
+      <pc:sldChg chg="modSp mod">
+        <pc:chgData name="Anatoliy Kigel" userId="7432c6c4687b0a9c" providerId="LiveId" clId="{CD4028F6-0983-40BE-96C5-7B3BCDB202FC}" dt="2021-06-28T17:30:38.434" v="12" actId="20577"/>
+        <pc:sldMkLst>
+          <pc:docMk/>
+          <pc:sldMk cId="3928218066" sldId="260"/>
+        </pc:sldMkLst>
+        <pc:spChg chg="mod">
+          <ac:chgData name="Anatoliy Kigel" userId="7432c6c4687b0a9c" providerId="LiveId" clId="{CD4028F6-0983-40BE-96C5-7B3BCDB202FC}" dt="2021-06-28T17:30:30.463" v="1" actId="20577"/>
+          <ac:spMkLst>
+            <pc:docMk/>
+            <pc:sldMk cId="3928218066" sldId="260"/>
+            <ac:spMk id="2" creationId="{00000000-0000-0000-0000-000000000000}"/>
+          </ac:spMkLst>
+        </pc:spChg>
+        <pc:spChg chg="mod">
+          <ac:chgData name="Anatoliy Kigel" userId="7432c6c4687b0a9c" providerId="LiveId" clId="{CD4028F6-0983-40BE-96C5-7B3BCDB202FC}" dt="2021-06-28T17:30:38.434" v="12" actId="20577"/>
+          <ac:spMkLst>
+            <pc:docMk/>
+            <pc:sldMk cId="3928218066" sldId="260"/>
+            <ac:spMk id="10" creationId="{00000000-0000-0000-0000-000000000000}"/>
+          </ac:spMkLst>
+        </pc:spChg>
+      </pc:sldChg>
+      <pc:sldChg chg="modSp mod">
+        <pc:chgData name="Anatoliy Kigel" userId="7432c6c4687b0a9c" providerId="LiveId" clId="{CD4028F6-0983-40BE-96C5-7B3BCDB202FC}" dt="2021-06-28T17:30:49.388" v="19" actId="20577"/>
+        <pc:sldMkLst>
+          <pc:docMk/>
+          <pc:sldMk cId="599313642" sldId="302"/>
+        </pc:sldMkLst>
+        <pc:spChg chg="mod">
+          <ac:chgData name="Anatoliy Kigel" userId="7432c6c4687b0a9c" providerId="LiveId" clId="{CD4028F6-0983-40BE-96C5-7B3BCDB202FC}" dt="2021-06-28T17:30:45.772" v="14" actId="20577"/>
+          <ac:spMkLst>
+            <pc:docMk/>
+            <pc:sldMk cId="599313642" sldId="302"/>
+            <ac:spMk id="2" creationId="{00000000-0000-0000-0000-000000000000}"/>
+          </ac:spMkLst>
+        </pc:spChg>
+        <pc:spChg chg="mod">
+          <ac:chgData name="Anatoliy Kigel" userId="7432c6c4687b0a9c" providerId="LiveId" clId="{CD4028F6-0983-40BE-96C5-7B3BCDB202FC}" dt="2021-06-28T17:30:49.388" v="19" actId="20577"/>
+          <ac:spMkLst>
+            <pc:docMk/>
+            <pc:sldMk cId="599313642" sldId="302"/>
+            <ac:spMk id="10" creationId="{00000000-0000-0000-0000-000000000000}"/>
+          </ac:spMkLst>
+        </pc:spChg>
+      </pc:sldChg>
+    </pc:docChg>
+  </pc:docChgLst>
+  <pc:docChgLst>
+    <pc:chgData name="Anatoliy Kigel" userId="7432c6c4687b0a9c" providerId="LiveId" clId="{811541E5-4FA4-4E7F-8C1A-E36EC8893D05}"/>
+    <pc:docChg chg="undo custSel addSld delSld modSld">
+      <pc:chgData name="Anatoliy Kigel" userId="7432c6c4687b0a9c" providerId="LiveId" clId="{811541E5-4FA4-4E7F-8C1A-E36EC8893D05}" dt="2021-05-07T11:13:20.286" v="30" actId="1076"/>
+      <pc:docMkLst>
+        <pc:docMk/>
+      </pc:docMkLst>
+      <pc:sldChg chg="modSp mod">
+        <pc:chgData name="Anatoliy Kigel" userId="7432c6c4687b0a9c" providerId="LiveId" clId="{811541E5-4FA4-4E7F-8C1A-E36EC8893D05}" dt="2021-05-07T11:12:55.476" v="7" actId="20577"/>
+        <pc:sldMkLst>
+          <pc:docMk/>
+          <pc:sldMk cId="3928218066" sldId="260"/>
+        </pc:sldMkLst>
+        <pc:spChg chg="mod">
+          <ac:chgData name="Anatoliy Kigel" userId="7432c6c4687b0a9c" providerId="LiveId" clId="{811541E5-4FA4-4E7F-8C1A-E36EC8893D05}" dt="2021-05-07T11:12:51.717" v="1" actId="20577"/>
+          <ac:spMkLst>
+            <pc:docMk/>
+            <pc:sldMk cId="3928218066" sldId="260"/>
+            <ac:spMk id="2" creationId="{00000000-0000-0000-0000-000000000000}"/>
+          </ac:spMkLst>
+        </pc:spChg>
+        <pc:spChg chg="mod">
+          <ac:chgData name="Anatoliy Kigel" userId="7432c6c4687b0a9c" providerId="LiveId" clId="{811541E5-4FA4-4E7F-8C1A-E36EC8893D05}" dt="2021-05-07T11:12:55.476" v="7" actId="20577"/>
+          <ac:spMkLst>
+            <pc:docMk/>
+            <pc:sldMk cId="3928218066" sldId="260"/>
+            <ac:spMk id="10" creationId="{00000000-0000-0000-0000-000000000000}"/>
+          </ac:spMkLst>
+        </pc:spChg>
+      </pc:sldChg>
+      <pc:sldChg chg="modSp mod">
+        <pc:chgData name="Anatoliy Kigel" userId="7432c6c4687b0a9c" providerId="LiveId" clId="{811541E5-4FA4-4E7F-8C1A-E36EC8893D05}" dt="2021-05-07T11:13:20.286" v="30" actId="1076"/>
+        <pc:sldMkLst>
+          <pc:docMk/>
+          <pc:sldMk cId="599313642" sldId="302"/>
+        </pc:sldMkLst>
+        <pc:spChg chg="mod">
+          <ac:chgData name="Anatoliy Kigel" userId="7432c6c4687b0a9c" providerId="LiveId" clId="{811541E5-4FA4-4E7F-8C1A-E36EC8893D05}" dt="2021-05-07T11:13:07.925" v="11" actId="20577"/>
+          <ac:spMkLst>
+            <pc:docMk/>
+            <pc:sldMk cId="599313642" sldId="302"/>
+            <ac:spMk id="2" creationId="{00000000-0000-0000-0000-000000000000}"/>
+          </ac:spMkLst>
+        </pc:spChg>
+        <pc:spChg chg="mod">
+          <ac:chgData name="Anatoliy Kigel" userId="7432c6c4687b0a9c" providerId="LiveId" clId="{811541E5-4FA4-4E7F-8C1A-E36EC8893D05}" dt="2021-05-07T11:13:20.286" v="30" actId="1076"/>
+          <ac:spMkLst>
+            <pc:docMk/>
+            <pc:sldMk cId="599313642" sldId="302"/>
+            <ac:spMk id="10" creationId="{00000000-0000-0000-0000-000000000000}"/>
+          </ac:spMkLst>
+        </pc:spChg>
+      </pc:sldChg>
+      <pc:sldChg chg="add del">
+        <pc:chgData name="Anatoliy Kigel" userId="7432c6c4687b0a9c" providerId="LiveId" clId="{811541E5-4FA4-4E7F-8C1A-E36EC8893D05}" dt="2021-05-07T11:13:04.816" v="9"/>
+        <pc:sldMkLst>
+          <pc:docMk/>
+          <pc:sldMk cId="2874574352" sldId="396"/>
+        </pc:sldMkLst>
+      </pc:sldChg>
+    </pc:docChg>
+  </pc:docChgLst>
+  <pc:docChgLst>
+    <pc:chgData name="Anatoliy Kigel" userId="7432c6c4687b0a9c" providerId="LiveId" clId="{92A8ADEE-453E-4C6D-B3FD-6C87386FDB4C}"/>
+    <pc:docChg chg="delSld modSection">
+      <pc:chgData name="Anatoliy Kigel" userId="7432c6c4687b0a9c" providerId="LiveId" clId="{92A8ADEE-453E-4C6D-B3FD-6C87386FDB4C}" dt="2021-03-22T09:13:53.619" v="0" actId="47"/>
+      <pc:docMkLst>
+        <pc:docMk/>
+      </pc:docMkLst>
+      <pc:sldChg chg="del">
+        <pc:chgData name="Anatoliy Kigel" userId="7432c6c4687b0a9c" providerId="LiveId" clId="{92A8ADEE-453E-4C6D-B3FD-6C87386FDB4C}" dt="2021-03-22T09:13:53.619" v="0" actId="47"/>
+        <pc:sldMkLst>
+          <pc:docMk/>
+          <pc:sldMk cId="3410126731" sldId="396"/>
+        </pc:sldMkLst>
+      </pc:sldChg>
+    </pc:docChg>
+  </pc:docChgLst>
 </pc:chgInfo>
 </file>
 
@@ -1773,7 +1797,7 @@
             <a:fld id="{85522811-C5C6-42D2-A409-F8556720C93F}" type="datetimeFigureOut">
               <a:rPr lang="uk-UA" smtClean="0"/>
               <a:pPr/>
-              <a:t>01.06.2022</a:t>
+              <a:t>02.06.2022</a:t>
             </a:fld>
             <a:endParaRPr lang="uk-UA"/>
           </a:p>
@@ -2697,7 +2721,7 @@
             <a:fld id="{E6FC6B0D-6115-4D7C-8040-9C8E2349BB6E}" type="datetime1">
               <a:rPr lang="uk-UA" smtClean="0"/>
               <a:pPr/>
-              <a:t>01.06.2022</a:t>
+              <a:t>02.06.2022</a:t>
             </a:fld>
             <a:endParaRPr lang="uk-UA"/>
           </a:p>
@@ -2864,7 +2888,7 @@
             <a:fld id="{996367BA-0A39-4DE2-BFC3-D5290044365E}" type="datetime1">
               <a:rPr lang="uk-UA" smtClean="0"/>
               <a:pPr/>
-              <a:t>01.06.2022</a:t>
+              <a:t>02.06.2022</a:t>
             </a:fld>
             <a:endParaRPr lang="uk-UA"/>
           </a:p>
@@ -3041,7 +3065,7 @@
             <a:fld id="{1BD6A67F-6C29-47DC-AF8A-FDB3C787DF70}" type="datetime1">
               <a:rPr lang="uk-UA" smtClean="0"/>
               <a:pPr/>
-              <a:t>01.06.2022</a:t>
+              <a:t>02.06.2022</a:t>
             </a:fld>
             <a:endParaRPr lang="uk-UA"/>
           </a:p>
@@ -3208,7 +3232,7 @@
             <a:fld id="{1657D9C5-7FF1-434F-B56E-9BAD559744E9}" type="datetime1">
               <a:rPr lang="uk-UA" smtClean="0"/>
               <a:pPr/>
-              <a:t>01.06.2022</a:t>
+              <a:t>02.06.2022</a:t>
             </a:fld>
             <a:endParaRPr lang="uk-UA"/>
           </a:p>
@@ -3451,7 +3475,7 @@
             <a:fld id="{2CEB0FC9-DE63-476B-A1A9-BE934D9049F8}" type="datetime1">
               <a:rPr lang="uk-UA" smtClean="0"/>
               <a:pPr/>
-              <a:t>01.06.2022</a:t>
+              <a:t>02.06.2022</a:t>
             </a:fld>
             <a:endParaRPr lang="uk-UA"/>
           </a:p>
@@ -3736,7 +3760,7 @@
             <a:fld id="{F964460F-86E2-4DF6-9D0F-12F5005CF375}" type="datetime1">
               <a:rPr lang="uk-UA" smtClean="0"/>
               <a:pPr/>
-              <a:t>01.06.2022</a:t>
+              <a:t>02.06.2022</a:t>
             </a:fld>
             <a:endParaRPr lang="uk-UA"/>
           </a:p>
@@ -4155,7 +4179,7 @@
             <a:fld id="{C521715E-DDCD-4267-B0A5-2918B6F6768A}" type="datetime1">
               <a:rPr lang="uk-UA" smtClean="0"/>
               <a:pPr/>
-              <a:t>01.06.2022</a:t>
+              <a:t>02.06.2022</a:t>
             </a:fld>
             <a:endParaRPr lang="uk-UA"/>
           </a:p>
@@ -4270,7 +4294,7 @@
             <a:fld id="{9289842C-EB2D-4EBB-A272-2F6A49D9794D}" type="datetime1">
               <a:rPr lang="uk-UA" smtClean="0"/>
               <a:pPr/>
-              <a:t>01.06.2022</a:t>
+              <a:t>02.06.2022</a:t>
             </a:fld>
             <a:endParaRPr lang="uk-UA"/>
           </a:p>
@@ -4362,7 +4386,7 @@
             <a:fld id="{D036F091-B700-4B52-99AC-85D0FD94D904}" type="datetime1">
               <a:rPr lang="uk-UA" smtClean="0"/>
               <a:pPr/>
-              <a:t>01.06.2022</a:t>
+              <a:t>02.06.2022</a:t>
             </a:fld>
             <a:endParaRPr lang="uk-UA"/>
           </a:p>
@@ -4636,7 +4660,7 @@
             <a:fld id="{B35DFABA-3811-4634-B803-2EAC4CD0063B}" type="datetime1">
               <a:rPr lang="uk-UA" smtClean="0"/>
               <a:pPr/>
-              <a:t>01.06.2022</a:t>
+              <a:t>02.06.2022</a:t>
             </a:fld>
             <a:endParaRPr lang="uk-UA"/>
           </a:p>
@@ -4886,7 +4910,7 @@
             <a:fld id="{8A9EA25E-F88E-463A-A119-D1E55A881002}" type="datetime1">
               <a:rPr lang="uk-UA" smtClean="0"/>
               <a:pPr/>
-              <a:t>01.06.2022</a:t>
+              <a:t>02.06.2022</a:t>
             </a:fld>
             <a:endParaRPr lang="uk-UA"/>
           </a:p>
@@ -5096,7 +5120,7 @@
             <a:fld id="{E708ED03-0080-49A2-B709-7DA4ACB3A1C3}" type="datetime1">
               <a:rPr lang="uk-UA" smtClean="0"/>
               <a:pPr/>
-              <a:t>01.06.2022</a:t>
+              <a:t>02.06.2022</a:t>
             </a:fld>
             <a:endParaRPr lang="uk-UA"/>
           </a:p>
@@ -11464,12 +11488,12 @@
           <a:p>
             <a:pPr algn="ctr"/>
             <a:r>
-              <a:rPr lang="en-US" sz="3200" b="1" u="sng" dirty="0">
+              <a:rPr lang="en-US" sz="3200" b="1" u="sng">
                 <a:solidFill>
                   <a:srgbClr val="3333CC"/>
                 </a:solidFill>
               </a:rPr>
-              <a:t>https://webref.ru/html</a:t>
+              <a:t>https://css.in.ua/html/tags</a:t>
             </a:r>
             <a:endParaRPr lang="uk-UA" sz="3200" u="sng" dirty="0">
               <a:solidFill>

</xml_diff>